<commit_message>
Upload code for CCS811
</commit_message>
<xml_diff>
--- a/Report/09042022.pptx
+++ b/Report/09042022.pptx
@@ -4749,8 +4749,41 @@
             </a:r>
             <a:r>
               <a:rPr lang="en-US" dirty="0"/>
-              <a:t> dB?</a:t>
-            </a:r>
+              <a:t> dB? (</a:t>
+            </a:r>
+            <a:r>
+              <a:rPr lang="en-US" dirty="0" err="1"/>
+              <a:t>không</a:t>
+            </a:r>
+            <a:r>
+              <a:rPr lang="en-US" dirty="0"/>
+              <a:t> </a:t>
+            </a:r>
+            <a:r>
+              <a:rPr lang="en-US" dirty="0" err="1"/>
+              <a:t>cần</a:t>
+            </a:r>
+            <a:r>
+              <a:rPr lang="en-US" dirty="0"/>
+              <a:t> </a:t>
+            </a:r>
+            <a:r>
+              <a:rPr lang="en-US" dirty="0" err="1"/>
+              <a:t>chính</a:t>
+            </a:r>
+            <a:r>
+              <a:rPr lang="en-US" dirty="0"/>
+              <a:t> </a:t>
+            </a:r>
+            <a:r>
+              <a:rPr lang="en-US" dirty="0" err="1"/>
+              <a:t>xác</a:t>
+            </a:r>
+            <a:r>
+              <a:rPr lang="en-US"/>
+              <a:t>)</a:t>
+            </a:r>
+            <a:endParaRPr lang="en-US" dirty="0"/>
           </a:p>
           <a:p>
             <a:r>

</xml_diff>